<commit_message>
Included Data Enhancement section
</commit_message>
<xml_diff>
--- a/Presentation.pptx
+++ b/Presentation.pptx
@@ -18,7 +18,10 @@
     <p:sldId id="264" r:id="rId12"/>
     <p:sldId id="270" r:id="rId13"/>
     <p:sldId id="271" r:id="rId14"/>
-    <p:sldId id="272" r:id="rId15"/>
+    <p:sldId id="273" r:id="rId15"/>
+    <p:sldId id="274" r:id="rId16"/>
+    <p:sldId id="275" r:id="rId17"/>
+    <p:sldId id="272" r:id="rId18"/>
   </p:sldIdLst>
   <p:sldSz cx="12192000" cy="6858000"/>
   <p:notesSz cx="6858000" cy="9144000"/>
@@ -8433,7 +8436,436 @@
           <a:p>
             <a:r>
               <a:rPr lang="en-US" dirty="0"/>
-              <a:t>Model Deployment</a:t>
+              <a:t>Dataset Enhancement</a:t>
+            </a:r>
+            <a:br>
+              <a:rPr lang="en-US" dirty="0"/>
+            </a:br>
+            <a:r>
+              <a:rPr lang="en-US" sz="1800" dirty="0"/>
+              <a:t>State at least 3 research questions you would like to address and describe your thought process behind how you formulated these research questions.</a:t>
+            </a:r>
+          </a:p>
+        </p:txBody>
+      </p:sp>
+      <p:sp>
+        <p:nvSpPr>
+          <p:cNvPr id="6" name="Content Placeholder 2">
+            <a:extLst>
+              <a:ext uri="{FF2B5EF4-FFF2-40B4-BE49-F238E27FC236}">
+                <a16:creationId xmlns:a16="http://schemas.microsoft.com/office/drawing/2014/main" id="{86BEF2E1-9666-9F4D-913C-DD2262D3B152}"/>
+              </a:ext>
+            </a:extLst>
+          </p:cNvPr>
+          <p:cNvSpPr>
+            <a:spLocks noGrp="1"/>
+          </p:cNvSpPr>
+          <p:nvPr>
+            <p:ph idx="1"/>
+          </p:nvPr>
+        </p:nvSpPr>
+        <p:spPr>
+          <a:xfrm>
+            <a:off x="2589211" y="2032000"/>
+            <a:ext cx="8911687" cy="4201889"/>
+          </a:xfrm>
+        </p:spPr>
+        <p:txBody>
+          <a:bodyPr>
+            <a:normAutofit/>
+          </a:bodyPr>
+          <a:lstStyle/>
+          <a:p>
+            <a:r>
+              <a:rPr lang="en-US" dirty="0"/>
+              <a:t>Likelihood of Faculty Churn:</a:t>
+            </a:r>
+          </a:p>
+          <a:p>
+            <a:pPr lvl="1"/>
+            <a:r>
+              <a:rPr lang="en-US" dirty="0"/>
+              <a:t>As we observed high variance in salaries, it may result in faculty to pursue other opportunities and is an important question for the college to research.</a:t>
+            </a:r>
+          </a:p>
+          <a:p>
+            <a:r>
+              <a:rPr lang="en-US" dirty="0"/>
+              <a:t>Salary Offer on Contract Renewal:</a:t>
+            </a:r>
+          </a:p>
+          <a:p>
+            <a:pPr lvl="1"/>
+            <a:r>
+              <a:rPr lang="en-US" dirty="0"/>
+              <a:t>Following the earlier question, the college would also like to know the market demand for their faculty’s profile. This would enable them to offer them the right salary and retain them. </a:t>
+            </a:r>
+          </a:p>
+          <a:p>
+            <a:r>
+              <a:rPr lang="en-US" dirty="0"/>
+              <a:t>Impact of Demographic Profile on Salary:</a:t>
+            </a:r>
+          </a:p>
+          <a:p>
+            <a:pPr lvl="1"/>
+            <a:r>
+              <a:rPr lang="en-US" dirty="0"/>
+              <a:t>Although there are very low number of female faculty at the college, we observed the average salary for women is less than their male counterparts. Also, we saw a non-linear salary trajectory salary as years of service increase. Age could be a leading factor, however, we can also analyze additional personal attributes such as race, color, religion and national origin.</a:t>
+            </a:r>
+          </a:p>
+          <a:p>
+            <a:endParaRPr lang="en-US" dirty="0"/>
+          </a:p>
+        </p:txBody>
+      </p:sp>
+    </p:spTree>
+    <p:extLst>
+      <p:ext uri="{BB962C8B-B14F-4D97-AF65-F5344CB8AC3E}">
+        <p14:creationId xmlns:p14="http://schemas.microsoft.com/office/powerpoint/2010/main" val="664680585"/>
+      </p:ext>
+    </p:extLst>
+  </p:cSld>
+  <p:clrMapOvr>
+    <a:masterClrMapping/>
+  </p:clrMapOvr>
+</p:sld>
+</file>
+
+<file path=ppt/slides/slide15.xml><?xml version="1.0" encoding="utf-8"?>
+<p:sld xmlns:a="http://schemas.openxmlformats.org/drawingml/2006/main" xmlns:r="http://schemas.openxmlformats.org/officeDocument/2006/relationships" xmlns:p="http://schemas.openxmlformats.org/presentationml/2006/main">
+  <p:cSld>
+    <p:spTree>
+      <p:nvGrpSpPr>
+        <p:cNvPr id="1" name=""/>
+        <p:cNvGrpSpPr/>
+        <p:nvPr/>
+      </p:nvGrpSpPr>
+      <p:grpSpPr>
+        <a:xfrm>
+          <a:off x="0" y="0"/>
+          <a:ext cx="0" cy="0"/>
+          <a:chOff x="0" y="0"/>
+          <a:chExt cx="0" cy="0"/>
+        </a:xfrm>
+      </p:grpSpPr>
+      <p:sp>
+        <p:nvSpPr>
+          <p:cNvPr id="2" name="Title 1">
+            <a:extLst>
+              <a:ext uri="{FF2B5EF4-FFF2-40B4-BE49-F238E27FC236}">
+                <a16:creationId xmlns:a16="http://schemas.microsoft.com/office/drawing/2014/main" id="{069E6E60-9726-B04E-BD69-E4CA8F713FA4}"/>
+              </a:ext>
+            </a:extLst>
+          </p:cNvPr>
+          <p:cNvSpPr>
+            <a:spLocks noGrp="1"/>
+          </p:cNvSpPr>
+          <p:nvPr>
+            <p:ph type="title"/>
+          </p:nvPr>
+        </p:nvSpPr>
+        <p:spPr/>
+        <p:txBody>
+          <a:bodyPr>
+            <a:normAutofit/>
+          </a:bodyPr>
+          <a:lstStyle/>
+          <a:p>
+            <a:r>
+              <a:rPr lang="en-US"/>
+              <a:t>Dataset Enhancement</a:t>
+            </a:r>
+            <a:br>
+              <a:rPr lang="en-US"/>
+            </a:br>
+            <a:r>
+              <a:rPr lang="en-US" sz="1800"/>
+              <a:t>Prepare a list of 5-7 additional attributes you would like to add to the dataset. Prepare a brief explanation for each attribute.</a:t>
+            </a:r>
+            <a:endParaRPr lang="en-US" sz="1800" dirty="0"/>
+          </a:p>
+        </p:txBody>
+      </p:sp>
+      <p:sp>
+        <p:nvSpPr>
+          <p:cNvPr id="6" name="Content Placeholder 2">
+            <a:extLst>
+              <a:ext uri="{FF2B5EF4-FFF2-40B4-BE49-F238E27FC236}">
+                <a16:creationId xmlns:a16="http://schemas.microsoft.com/office/drawing/2014/main" id="{86BEF2E1-9666-9F4D-913C-DD2262D3B152}"/>
+              </a:ext>
+            </a:extLst>
+          </p:cNvPr>
+          <p:cNvSpPr>
+            <a:spLocks noGrp="1"/>
+          </p:cNvSpPr>
+          <p:nvPr>
+            <p:ph idx="1"/>
+          </p:nvPr>
+        </p:nvSpPr>
+        <p:spPr>
+          <a:xfrm>
+            <a:off x="2589212" y="2032000"/>
+            <a:ext cx="5310188" cy="4201889"/>
+          </a:xfrm>
+        </p:spPr>
+        <p:txBody>
+          <a:bodyPr>
+            <a:normAutofit lnSpcReduction="10000"/>
+          </a:bodyPr>
+          <a:lstStyle/>
+          <a:p>
+            <a:r>
+              <a:rPr lang="en-US" dirty="0"/>
+              <a:t>There is a large variance in Professor salaries. Following attributes would provide more insight on their skills and experience that may impact salary:</a:t>
+            </a:r>
+          </a:p>
+          <a:p>
+            <a:pPr lvl="1"/>
+            <a:r>
+              <a:rPr lang="en-US" dirty="0"/>
+              <a:t>No. of cited publications</a:t>
+            </a:r>
+          </a:p>
+          <a:p>
+            <a:pPr lvl="1"/>
+            <a:r>
+              <a:rPr lang="en-US" dirty="0"/>
+              <a:t>Awards received</a:t>
+            </a:r>
+          </a:p>
+          <a:p>
+            <a:pPr lvl="1"/>
+            <a:r>
+              <a:rPr lang="en-US" dirty="0"/>
+              <a:t>No. of projects in collaboration with industry/other institutions.</a:t>
+            </a:r>
+          </a:p>
+          <a:p>
+            <a:pPr lvl="1"/>
+            <a:r>
+              <a:rPr lang="en-US" dirty="0"/>
+              <a:t>No. of programs taught (both within and outside college)</a:t>
+            </a:r>
+          </a:p>
+          <a:p>
+            <a:pPr lvl="1"/>
+            <a:r>
+              <a:rPr lang="en-US" dirty="0"/>
+              <a:t>Compensation details</a:t>
+            </a:r>
+          </a:p>
+          <a:p>
+            <a:r>
+              <a:rPr lang="en-US" dirty="0"/>
+              <a:t>As shown in the plot (right), there is a non-linear trend as experience increases. Age may be an important factor to review.</a:t>
+            </a:r>
+          </a:p>
+          <a:p>
+            <a:endParaRPr lang="en-US" dirty="0"/>
+          </a:p>
+          <a:p>
+            <a:endParaRPr lang="en-US" dirty="0"/>
+          </a:p>
+        </p:txBody>
+      </p:sp>
+      <p:pic>
+        <p:nvPicPr>
+          <p:cNvPr id="3" name="Picture 2">
+            <a:extLst>
+              <a:ext uri="{FF2B5EF4-FFF2-40B4-BE49-F238E27FC236}">
+                <a16:creationId xmlns:a16="http://schemas.microsoft.com/office/drawing/2014/main" id="{7A7C9B2B-A2F1-6C4D-A78E-0293085F00AE}"/>
+              </a:ext>
+            </a:extLst>
+          </p:cNvPr>
+          <p:cNvPicPr>
+            <a:picLocks noChangeAspect="1"/>
+          </p:cNvPicPr>
+          <p:nvPr/>
+        </p:nvPicPr>
+        <p:blipFill>
+          <a:blip r:embed="rId2"/>
+          <a:stretch>
+            <a:fillRect/>
+          </a:stretch>
+        </p:blipFill>
+        <p:spPr>
+          <a:xfrm>
+            <a:off x="8077200" y="2032000"/>
+            <a:ext cx="3937000" cy="2451340"/>
+          </a:xfrm>
+          <a:prstGeom prst="rect">
+            <a:avLst/>
+          </a:prstGeom>
+        </p:spPr>
+      </p:pic>
+    </p:spTree>
+    <p:extLst>
+      <p:ext uri="{BB962C8B-B14F-4D97-AF65-F5344CB8AC3E}">
+        <p14:creationId xmlns:p14="http://schemas.microsoft.com/office/powerpoint/2010/main" val="2596762261"/>
+      </p:ext>
+    </p:extLst>
+  </p:cSld>
+  <p:clrMapOvr>
+    <a:masterClrMapping/>
+  </p:clrMapOvr>
+</p:sld>
+</file>
+
+<file path=ppt/slides/slide16.xml><?xml version="1.0" encoding="utf-8"?>
+<p:sld xmlns:a="http://schemas.openxmlformats.org/drawingml/2006/main" xmlns:r="http://schemas.openxmlformats.org/officeDocument/2006/relationships" xmlns:p="http://schemas.openxmlformats.org/presentationml/2006/main">
+  <p:cSld>
+    <p:spTree>
+      <p:nvGrpSpPr>
+        <p:cNvPr id="1" name=""/>
+        <p:cNvGrpSpPr/>
+        <p:nvPr/>
+      </p:nvGrpSpPr>
+      <p:grpSpPr>
+        <a:xfrm>
+          <a:off x="0" y="0"/>
+          <a:ext cx="0" cy="0"/>
+          <a:chOff x="0" y="0"/>
+          <a:chExt cx="0" cy="0"/>
+        </a:xfrm>
+      </p:grpSpPr>
+      <p:sp>
+        <p:nvSpPr>
+          <p:cNvPr id="2" name="Title 1">
+            <a:extLst>
+              <a:ext uri="{FF2B5EF4-FFF2-40B4-BE49-F238E27FC236}">
+                <a16:creationId xmlns:a16="http://schemas.microsoft.com/office/drawing/2014/main" id="{069E6E60-9726-B04E-BD69-E4CA8F713FA4}"/>
+              </a:ext>
+            </a:extLst>
+          </p:cNvPr>
+          <p:cNvSpPr>
+            <a:spLocks noGrp="1"/>
+          </p:cNvSpPr>
+          <p:nvPr>
+            <p:ph type="title"/>
+          </p:nvPr>
+        </p:nvSpPr>
+        <p:spPr/>
+        <p:txBody>
+          <a:bodyPr>
+            <a:normAutofit fontScale="90000"/>
+          </a:bodyPr>
+          <a:lstStyle/>
+          <a:p>
+            <a:r>
+              <a:rPr lang="en-US" sz="4000" dirty="0"/>
+              <a:t>Dataset Enhancement</a:t>
+            </a:r>
+            <a:br>
+              <a:rPr lang="en-US" dirty="0"/>
+            </a:br>
+            <a:r>
+              <a:rPr lang="en-US" sz="1800" dirty="0"/>
+              <a:t>Estimate and justify the appropriate sample size (and sampling technique, if desired) that would be required to address the research questions you defined.</a:t>
+            </a:r>
+          </a:p>
+        </p:txBody>
+      </p:sp>
+      <p:sp>
+        <p:nvSpPr>
+          <p:cNvPr id="6" name="Content Placeholder 2">
+            <a:extLst>
+              <a:ext uri="{FF2B5EF4-FFF2-40B4-BE49-F238E27FC236}">
+                <a16:creationId xmlns:a16="http://schemas.microsoft.com/office/drawing/2014/main" id="{86BEF2E1-9666-9F4D-913C-DD2262D3B152}"/>
+              </a:ext>
+            </a:extLst>
+          </p:cNvPr>
+          <p:cNvSpPr>
+            <a:spLocks noGrp="1"/>
+          </p:cNvSpPr>
+          <p:nvPr>
+            <p:ph idx="1"/>
+          </p:nvPr>
+        </p:nvSpPr>
+        <p:spPr>
+          <a:xfrm>
+            <a:off x="2589212" y="2032000"/>
+            <a:ext cx="3198130" cy="4201889"/>
+          </a:xfrm>
+        </p:spPr>
+        <p:txBody>
+          <a:bodyPr>
+            <a:normAutofit/>
+          </a:bodyPr>
+          <a:lstStyle/>
+          <a:p>
+            <a:r>
+              <a:rPr lang="en-US" dirty="0"/>
+              <a:t>The model accuracy is 79%. </a:t>
+            </a:r>
+          </a:p>
+          <a:p>
+            <a:r>
+              <a:rPr lang="en-US" dirty="0"/>
+              <a:t>AUC is 0.81 i.e. the probability that model will rank a randomly chosen positive instance higher than a randomly chosen negative one. </a:t>
+            </a:r>
+          </a:p>
+          <a:p>
+            <a:endParaRPr lang="en-US" dirty="0"/>
+          </a:p>
+        </p:txBody>
+      </p:sp>
+    </p:spTree>
+    <p:extLst>
+      <p:ext uri="{BB962C8B-B14F-4D97-AF65-F5344CB8AC3E}">
+        <p14:creationId xmlns:p14="http://schemas.microsoft.com/office/powerpoint/2010/main" val="614164605"/>
+      </p:ext>
+    </p:extLst>
+  </p:cSld>
+  <p:clrMapOvr>
+    <a:masterClrMapping/>
+  </p:clrMapOvr>
+</p:sld>
+</file>
+
+<file path=ppt/slides/slide17.xml><?xml version="1.0" encoding="utf-8"?>
+<p:sld xmlns:a="http://schemas.openxmlformats.org/drawingml/2006/main" xmlns:r="http://schemas.openxmlformats.org/officeDocument/2006/relationships" xmlns:p="http://schemas.openxmlformats.org/presentationml/2006/main">
+  <p:cSld>
+    <p:spTree>
+      <p:nvGrpSpPr>
+        <p:cNvPr id="1" name=""/>
+        <p:cNvGrpSpPr/>
+        <p:nvPr/>
+      </p:nvGrpSpPr>
+      <p:grpSpPr>
+        <a:xfrm>
+          <a:off x="0" y="0"/>
+          <a:ext cx="0" cy="0"/>
+          <a:chOff x="0" y="0"/>
+          <a:chExt cx="0" cy="0"/>
+        </a:xfrm>
+      </p:grpSpPr>
+      <p:sp>
+        <p:nvSpPr>
+          <p:cNvPr id="2" name="Title 1">
+            <a:extLst>
+              <a:ext uri="{FF2B5EF4-FFF2-40B4-BE49-F238E27FC236}">
+                <a16:creationId xmlns:a16="http://schemas.microsoft.com/office/drawing/2014/main" id="{069E6E60-9726-B04E-BD69-E4CA8F713FA4}"/>
+              </a:ext>
+            </a:extLst>
+          </p:cNvPr>
+          <p:cNvSpPr>
+            <a:spLocks noGrp="1"/>
+          </p:cNvSpPr>
+          <p:nvPr>
+            <p:ph type="title"/>
+          </p:nvPr>
+        </p:nvSpPr>
+        <p:spPr/>
+        <p:txBody>
+          <a:bodyPr>
+            <a:normAutofit/>
+          </a:bodyPr>
+          <a:lstStyle/>
+          <a:p>
+            <a:r>
+              <a:rPr lang="en-US" dirty="0"/>
+              <a:t>Annex: Model Deployment</a:t>
             </a:r>
             <a:endParaRPr lang="en-US" sz="1800" dirty="0"/>
           </a:p>
@@ -8558,8 +8990,8 @@
         </p:blipFill>
         <p:spPr bwMode="auto">
           <a:xfrm>
-            <a:off x="9599075" y="476250"/>
-            <a:ext cx="2322978" cy="1984210"/>
+            <a:off x="9768164" y="4608593"/>
+            <a:ext cx="1451982" cy="1240234"/>
           </a:xfrm>
           <a:prstGeom prst="rect">
             <a:avLst/>
@@ -8605,8 +9037,8 @@
         </p:blipFill>
         <p:spPr bwMode="auto">
           <a:xfrm>
-            <a:off x="9261355" y="2608319"/>
-            <a:ext cx="2615047" cy="1375009"/>
+            <a:off x="6095416" y="5858985"/>
+            <a:ext cx="1906703" cy="1002557"/>
           </a:xfrm>
           <a:prstGeom prst="rect">
             <a:avLst/>
@@ -8652,8 +9084,8 @@
         </p:blipFill>
         <p:spPr bwMode="auto">
           <a:xfrm>
-            <a:off x="6489241" y="2651384"/>
-            <a:ext cx="2540000" cy="2540000"/>
+            <a:off x="7872788" y="5859369"/>
+            <a:ext cx="1001790" cy="1001790"/>
           </a:xfrm>
           <a:prstGeom prst="rect">
             <a:avLst/>
@@ -8699,8 +9131,8 @@
         </p:blipFill>
         <p:spPr bwMode="auto">
           <a:xfrm>
-            <a:off x="8723923" y="4810732"/>
-            <a:ext cx="3198130" cy="1663611"/>
+            <a:off x="10418163" y="5859369"/>
+            <a:ext cx="1749779" cy="910204"/>
           </a:xfrm>
           <a:prstGeom prst="rect">
             <a:avLst/>
@@ -8746,8 +9178,8 @@
         </p:blipFill>
         <p:spPr bwMode="auto">
           <a:xfrm>
-            <a:off x="6447283" y="827404"/>
-            <a:ext cx="3386665" cy="1904999"/>
+            <a:off x="7283328" y="4608593"/>
+            <a:ext cx="2285316" cy="1285490"/>
           </a:xfrm>
           <a:prstGeom prst="rect">
             <a:avLst/>
@@ -8793,8 +9225,8 @@
         </p:blipFill>
         <p:spPr bwMode="auto">
           <a:xfrm>
-            <a:off x="6404660" y="5401193"/>
-            <a:ext cx="2053773" cy="1073150"/>
+            <a:off x="8874578" y="5880454"/>
+            <a:ext cx="1918740" cy="1002592"/>
           </a:xfrm>
           <a:prstGeom prst="rect">
             <a:avLst/>
@@ -8809,6 +9241,36 @@
               </a14:hiddenFill>
             </a:ext>
           </a:extLst>
+        </p:spPr>
+      </p:pic>
+      <p:pic>
+        <p:nvPicPr>
+          <p:cNvPr id="4" name="Picture 3">
+            <a:extLst>
+              <a:ext uri="{FF2B5EF4-FFF2-40B4-BE49-F238E27FC236}">
+                <a16:creationId xmlns:a16="http://schemas.microsoft.com/office/drawing/2014/main" id="{2A26C6CF-8D17-3A4D-952D-138E7DFD01B2}"/>
+              </a:ext>
+            </a:extLst>
+          </p:cNvPr>
+          <p:cNvPicPr>
+            <a:picLocks noChangeAspect="1"/>
+          </p:cNvPicPr>
+          <p:nvPr/>
+        </p:nvPicPr>
+        <p:blipFill>
+          <a:blip r:embed="rId11"/>
+          <a:stretch>
+            <a:fillRect/>
+          </a:stretch>
+        </p:blipFill>
+        <p:spPr>
+          <a:xfrm>
+            <a:off x="6681052" y="1721745"/>
+            <a:ext cx="5057385" cy="2463493"/>
+          </a:xfrm>
+          <a:prstGeom prst="rect">
+            <a:avLst/>
+          </a:prstGeom>
         </p:spPr>
       </p:pic>
     </p:spTree>
@@ -8885,7 +9347,12 @@
             <p:ph idx="1"/>
           </p:nvPr>
         </p:nvSpPr>
-        <p:spPr/>
+        <p:spPr>
+          <a:xfrm>
+            <a:off x="2592925" y="1540189"/>
+            <a:ext cx="8915400" cy="3777622"/>
+          </a:xfrm>
+        </p:spPr>
         <p:txBody>
           <a:bodyPr/>
           <a:lstStyle/>

</xml_diff>

<commit_message>
Defined null and alternate hypothesis in presentation. Added slide for sampling technique
</commit_message>
<xml_diff>
--- a/Presentation.pptx
+++ b/Presentation.pptx
@@ -120,6 +120,11 @@
       </a:defRPr>
     </a:lvl9pPr>
   </p:defaultTextStyle>
+  <p:extLst>
+    <p:ext uri="{EFAFB233-063F-42B5-8137-9DF3F51BA10A}">
+      <p15:sldGuideLst xmlns:p15="http://schemas.microsoft.com/office/powerpoint/2012/main"/>
+    </p:ext>
+  </p:extLst>
 </p:presentation>
 </file>
 
@@ -312,7 +317,7 @@
             <a:fld id="{B61BEF0D-F0BB-DE4B-95CE-6DB70DBA9567}" type="datetimeFigureOut">
               <a:rPr lang="en-US" dirty="0"/>
               <a:pPr/>
-              <a:t>7/30/21</a:t>
+              <a:t>8/2/21</a:t>
             </a:fld>
             <a:endParaRPr lang="en-US" dirty="0"/>
           </a:p>
@@ -647,7 +652,7 @@
             <a:fld id="{B61BEF0D-F0BB-DE4B-95CE-6DB70DBA9567}" type="datetimeFigureOut">
               <a:rPr lang="en-US" dirty="0"/>
               <a:pPr/>
-              <a:t>7/30/21</a:t>
+              <a:t>8/2/21</a:t>
             </a:fld>
             <a:endParaRPr lang="en-US" dirty="0"/>
           </a:p>
@@ -1045,7 +1050,7 @@
             <a:fld id="{B61BEF0D-F0BB-DE4B-95CE-6DB70DBA9567}" type="datetimeFigureOut">
               <a:rPr lang="en-US" dirty="0"/>
               <a:pPr/>
-              <a:t>7/30/21</a:t>
+              <a:t>8/2/21</a:t>
             </a:fld>
             <a:endParaRPr lang="en-US" dirty="0"/>
           </a:p>
@@ -1378,7 +1383,7 @@
             <a:fld id="{B61BEF0D-F0BB-DE4B-95CE-6DB70DBA9567}" type="datetimeFigureOut">
               <a:rPr lang="en-US" dirty="0"/>
               <a:pPr/>
-              <a:t>7/30/21</a:t>
+              <a:t>8/2/21</a:t>
             </a:fld>
             <a:endParaRPr lang="en-US" dirty="0"/>
           </a:p>
@@ -1695,7 +1700,7 @@
             <a:fld id="{B61BEF0D-F0BB-DE4B-95CE-6DB70DBA9567}" type="datetimeFigureOut">
               <a:rPr lang="en-US" dirty="0"/>
               <a:pPr/>
-              <a:t>7/30/21</a:t>
+              <a:t>8/2/21</a:t>
             </a:fld>
             <a:endParaRPr lang="en-US" dirty="0"/>
           </a:p>
@@ -2088,7 +2093,7 @@
             <a:fld id="{B61BEF0D-F0BB-DE4B-95CE-6DB70DBA9567}" type="datetimeFigureOut">
               <a:rPr lang="en-US" dirty="0"/>
               <a:pPr/>
-              <a:t>7/30/21</a:t>
+              <a:t>8/2/21</a:t>
             </a:fld>
             <a:endParaRPr lang="en-US" dirty="0"/>
           </a:p>
@@ -2342,7 +2347,7 @@
             <a:fld id="{B61BEF0D-F0BB-DE4B-95CE-6DB70DBA9567}" type="datetimeFigureOut">
               <a:rPr lang="en-US" dirty="0"/>
               <a:pPr/>
-              <a:t>7/30/21</a:t>
+              <a:t>8/2/21</a:t>
             </a:fld>
             <a:endParaRPr lang="en-US" dirty="0"/>
           </a:p>
@@ -2601,7 +2606,7 @@
             <a:fld id="{B61BEF0D-F0BB-DE4B-95CE-6DB70DBA9567}" type="datetimeFigureOut">
               <a:rPr lang="en-US" dirty="0"/>
               <a:pPr/>
-              <a:t>7/30/21</a:t>
+              <a:t>8/2/21</a:t>
             </a:fld>
             <a:endParaRPr lang="en-US" dirty="0"/>
           </a:p>
@@ -2860,7 +2865,7 @@
             <a:fld id="{B61BEF0D-F0BB-DE4B-95CE-6DB70DBA9567}" type="datetimeFigureOut">
               <a:rPr lang="en-US" dirty="0"/>
               <a:pPr/>
-              <a:t>7/30/21</a:t>
+              <a:t>8/2/21</a:t>
             </a:fld>
             <a:endParaRPr lang="en-US" dirty="0"/>
           </a:p>
@@ -3186,7 +3191,7 @@
             <a:fld id="{B61BEF0D-F0BB-DE4B-95CE-6DB70DBA9567}" type="datetimeFigureOut">
               <a:rPr lang="en-US" dirty="0"/>
               <a:pPr/>
-              <a:t>7/30/21</a:t>
+              <a:t>8/2/21</a:t>
             </a:fld>
             <a:endParaRPr lang="en-US" dirty="0"/>
           </a:p>
@@ -3506,7 +3511,7 @@
             <a:fld id="{B61BEF0D-F0BB-DE4B-95CE-6DB70DBA9567}" type="datetimeFigureOut">
               <a:rPr lang="en-US" dirty="0"/>
               <a:pPr/>
-              <a:t>7/30/21</a:t>
+              <a:t>8/2/21</a:t>
             </a:fld>
             <a:endParaRPr lang="en-US" dirty="0"/>
           </a:p>
@@ -3960,7 +3965,7 @@
             <a:fld id="{B61BEF0D-F0BB-DE4B-95CE-6DB70DBA9567}" type="datetimeFigureOut">
               <a:rPr lang="en-US" dirty="0"/>
               <a:pPr/>
-              <a:t>7/30/21</a:t>
+              <a:t>8/2/21</a:t>
             </a:fld>
             <a:endParaRPr lang="en-US" dirty="0"/>
           </a:p>
@@ -4162,7 +4167,7 @@
             <a:fld id="{B61BEF0D-F0BB-DE4B-95CE-6DB70DBA9567}" type="datetimeFigureOut">
               <a:rPr lang="en-US" dirty="0"/>
               <a:pPr/>
-              <a:t>7/30/21</a:t>
+              <a:t>8/2/21</a:t>
             </a:fld>
             <a:endParaRPr lang="en-US" dirty="0"/>
           </a:p>
@@ -4336,7 +4341,7 @@
             <a:fld id="{B61BEF0D-F0BB-DE4B-95CE-6DB70DBA9567}" type="datetimeFigureOut">
               <a:rPr lang="en-US" dirty="0"/>
               <a:pPr/>
-              <a:t>7/30/21</a:t>
+              <a:t>8/2/21</a:t>
             </a:fld>
             <a:endParaRPr lang="en-US" dirty="0"/>
           </a:p>
@@ -4666,7 +4671,7 @@
             <a:fld id="{B61BEF0D-F0BB-DE4B-95CE-6DB70DBA9567}" type="datetimeFigureOut">
               <a:rPr lang="en-US" dirty="0"/>
               <a:pPr/>
-              <a:t>7/30/21</a:t>
+              <a:t>8/2/21</a:t>
             </a:fld>
             <a:endParaRPr lang="en-US" dirty="0"/>
           </a:p>
@@ -5008,7 +5013,7 @@
             <a:fld id="{B61BEF0D-F0BB-DE4B-95CE-6DB70DBA9567}" type="datetimeFigureOut">
               <a:rPr lang="en-US" dirty="0"/>
               <a:pPr/>
-              <a:t>7/30/21</a:t>
+              <a:t>8/2/21</a:t>
             </a:fld>
             <a:endParaRPr lang="en-US" dirty="0"/>
           </a:p>
@@ -7122,7 +7127,7 @@
             <a:fld id="{B61BEF0D-F0BB-DE4B-95CE-6DB70DBA9567}" type="datetimeFigureOut">
               <a:rPr lang="en-US" dirty="0"/>
               <a:pPr/>
-              <a:t>7/30/21</a:t>
+              <a:t>8/2/21</a:t>
             </a:fld>
             <a:endParaRPr lang="en-US" dirty="0"/>
           </a:p>
@@ -8784,8 +8789,8 @@
         </p:nvSpPr>
         <p:spPr>
           <a:xfrm>
-            <a:off x="2589212" y="2032000"/>
-            <a:ext cx="3198130" cy="4201889"/>
+            <a:off x="2589211" y="2032000"/>
+            <a:ext cx="8417247" cy="4201889"/>
           </a:xfrm>
         </p:spPr>
         <p:txBody>
@@ -8796,13 +8801,19 @@
           <a:p>
             <a:r>
               <a:rPr lang="en-US" dirty="0"/>
-              <a:t>The model accuracy is 79%. </a:t>
+              <a:t>The sampling should be performed on other universities as well to analyze variability amongst university faculties. </a:t>
             </a:r>
           </a:p>
           <a:p>
             <a:r>
               <a:rPr lang="en-US" dirty="0"/>
-              <a:t>AUC is 0.81 i.e. the probability that model will rank a randomly chosen positive instance higher than a randomly chosen negative one. </a:t>
+              <a:t>Since there are fewer female faculty at the current university, and likely the case in others, we need to ensure that females are fairly represented as a group.</a:t>
+            </a:r>
+          </a:p>
+          <a:p>
+            <a:r>
+              <a:rPr lang="en-US" dirty="0"/>
+              <a:t>Firstly, universities should be randomly selected, followed by stratified sampling by gender.</a:t>
             </a:r>
           </a:p>
           <a:p>
@@ -9677,13 +9688,25 @@
         </p:spPr>
         <p:txBody>
           <a:bodyPr>
-            <a:normAutofit fontScale="85000" lnSpcReduction="20000"/>
+            <a:normAutofit fontScale="62500" lnSpcReduction="20000"/>
           </a:bodyPr>
           <a:lstStyle/>
           <a:p>
             <a:r>
               <a:rPr lang="en-US" dirty="0"/>
               <a:t>Ans: Yes</a:t>
+            </a:r>
+          </a:p>
+          <a:p>
+            <a:r>
+              <a:rPr lang="en-US" dirty="0"/>
+              <a:t>Null Hypothesis: The female average salary IS NOT different than the male average salary.</a:t>
+            </a:r>
+          </a:p>
+          <a:p>
+            <a:r>
+              <a:rPr lang="en-US" dirty="0"/>
+              <a:t>Alternative Hypothesis: The female average salary IS different than the male average salary.</a:t>
             </a:r>
           </a:p>
           <a:p>

</xml_diff>